<commit_message>
add something about long working distance objective
</commit_message>
<xml_diff>
--- a/ppt/2017.10.23.pptx
+++ b/ppt/2017.10.23.pptx
@@ -10,6 +10,7 @@
     <p:sldId id="259" r:id="rId4"/>
     <p:sldId id="258" r:id="rId5"/>
     <p:sldId id="260" r:id="rId6"/>
+    <p:sldId id="261" r:id="rId7"/>
   </p:sldIdLst>
   <p:sldSz cx="12192000" cy="6858000"/>
   <p:notesSz cx="6858000" cy="9144000"/>
@@ -4557,6 +4558,142 @@
 </p:sld>
 </file>
 
+<file path=ppt/slides/slide6.xml><?xml version="1.0" encoding="utf-8"?>
+<p:sld xmlns:a="http://schemas.openxmlformats.org/drawingml/2006/main" xmlns:r="http://schemas.openxmlformats.org/officeDocument/2006/relationships" xmlns:p="http://schemas.openxmlformats.org/presentationml/2006/main">
+  <p:cSld>
+    <p:spTree>
+      <p:nvGrpSpPr>
+        <p:cNvPr id="1" name=""/>
+        <p:cNvGrpSpPr/>
+        <p:nvPr/>
+      </p:nvGrpSpPr>
+      <p:grpSpPr>
+        <a:xfrm>
+          <a:off x="0" y="0"/>
+          <a:ext cx="0" cy="0"/>
+          <a:chOff x="0" y="0"/>
+          <a:chExt cx="0" cy="0"/>
+        </a:xfrm>
+      </p:grpSpPr>
+      <p:sp>
+        <p:nvSpPr>
+          <p:cNvPr id="2" name="标题 1"/>
+          <p:cNvSpPr>
+            <a:spLocks noGrp="1"/>
+          </p:cNvSpPr>
+          <p:nvPr>
+            <p:ph type="title"/>
+          </p:nvPr>
+        </p:nvSpPr>
+        <p:spPr/>
+        <p:txBody>
+          <a:bodyPr/>
+          <a:lstStyle/>
+          <a:p>
+            <a:r>
+              <a:rPr lang="en-US" altLang="zh-CN" dirty="0" smtClean="0"/>
+              <a:t>Long working distance objective</a:t>
+            </a:r>
+            <a:endParaRPr lang="zh-CN" altLang="en-US" dirty="0"/>
+          </a:p>
+        </p:txBody>
+      </p:sp>
+      <p:sp>
+        <p:nvSpPr>
+          <p:cNvPr id="3" name="内容占位符 2"/>
+          <p:cNvSpPr>
+            <a:spLocks noGrp="1"/>
+          </p:cNvSpPr>
+          <p:nvPr>
+            <p:ph idx="1"/>
+          </p:nvPr>
+        </p:nvSpPr>
+        <p:spPr/>
+        <p:txBody>
+          <a:bodyPr/>
+          <a:lstStyle/>
+          <a:p>
+            <a:pPr>
+              <a:buClrTx/>
+              <a:buFont typeface="Wingdings" panose="05000000000000000000" pitchFamily="2" charset="2"/>
+              <a:buChar char="Ø"/>
+            </a:pPr>
+            <a:r>
+              <a:rPr lang="en-US" altLang="zh-CN" dirty="0"/>
+              <a:t>The long working distance objective we did build for Maryland this year had a tested </a:t>
+            </a:r>
+            <a:r>
+              <a:rPr lang="en-US" altLang="zh-CN" dirty="0" err="1"/>
+              <a:t>wavefront</a:t>
+            </a:r>
+            <a:r>
+              <a:rPr lang="en-US" altLang="zh-CN" dirty="0"/>
+              <a:t> error of about 0.15 waves </a:t>
+            </a:r>
+            <a:r>
+              <a:rPr lang="en-US" altLang="zh-CN" dirty="0" err="1"/>
+              <a:t>rms</a:t>
+            </a:r>
+            <a:r>
+              <a:rPr lang="en-US" altLang="zh-CN" dirty="0"/>
+              <a:t> at 355 nm.  The maximum possible error predicted by the </a:t>
+            </a:r>
+            <a:r>
+              <a:rPr lang="en-US" altLang="zh-CN" dirty="0" err="1"/>
+              <a:t>tolerancing</a:t>
+            </a:r>
+            <a:r>
+              <a:rPr lang="en-US" altLang="zh-CN" dirty="0"/>
+              <a:t> analysis is 0.2 waves </a:t>
+            </a:r>
+            <a:r>
+              <a:rPr lang="en-US" altLang="zh-CN" dirty="0" err="1"/>
+              <a:t>rms</a:t>
+            </a:r>
+            <a:r>
+              <a:rPr lang="en-US" altLang="zh-CN" dirty="0"/>
+              <a:t> at 355 nm.  The least expensive option is to have us build more of the catalog, 25 mm working distance objectives, but the </a:t>
+            </a:r>
+            <a:r>
+              <a:rPr lang="en-US" altLang="zh-CN" dirty="0" err="1"/>
+              <a:t>wavefront</a:t>
+            </a:r>
+            <a:r>
+              <a:rPr lang="en-US" altLang="zh-CN" dirty="0"/>
+              <a:t> error will be larger than the custom objective</a:t>
+            </a:r>
+            <a:r>
+              <a:rPr lang="en-US" altLang="zh-CN" dirty="0" smtClean="0"/>
+              <a:t>.</a:t>
+            </a:r>
+          </a:p>
+          <a:p>
+            <a:pPr>
+              <a:buClrTx/>
+              <a:buFont typeface="Wingdings" panose="05000000000000000000" pitchFamily="2" charset="2"/>
+              <a:buChar char="Ø"/>
+            </a:pPr>
+            <a:r>
+              <a:rPr lang="en-US" altLang="zh-CN" dirty="0"/>
+              <a:t>Lastly, I have one more possible option, we are working on a new design that has infinite conjugate input and has a working distance of about 20 mm and the NA=0.55.  This is a custom objective that is designed to operate at 397 and 422 nm, although we could tweak the design to operate at 370 nm.  Again, since this is custom it will be expensive, although if we can get more than one party to purchase the assemblies then the unit costs will be reduced for everyone.</a:t>
+            </a:r>
+            <a:endParaRPr lang="zh-CN" altLang="en-US" dirty="0"/>
+          </a:p>
+        </p:txBody>
+      </p:sp>
+    </p:spTree>
+    <p:extLst>
+      <p:ext uri="{BB962C8B-B14F-4D97-AF65-F5344CB8AC3E}">
+        <p14:creationId xmlns:p14="http://schemas.microsoft.com/office/powerpoint/2010/main" val="2247528028"/>
+      </p:ext>
+    </p:extLst>
+  </p:cSld>
+  <p:clrMapOvr>
+    <a:masterClrMapping/>
+  </p:clrMapOvr>
+</p:sld>
+</file>
+
 <file path=ppt/theme/theme1.xml><?xml version="1.0" encoding="utf-8"?>
 <a:theme xmlns:a="http://schemas.openxmlformats.org/drawingml/2006/main" name="回顾">
   <a:themeElements>

</xml_diff>